<commit_message>
Add breakdown of addEventListener to spekaer notes
This commit adds speaker notes to the lecture section on event
listeners with a suggested breakdown explanation of what each part
of the long function call corresponds to (e.g. element, action).
</commit_message>
<xml_diff>
--- a/Curriculum/Week_2/Lectures/2.2_JavaScript_Interacting_with_HTML.pptx
+++ b/Curriculum/Week_2/Lectures/2.2_JavaScript_Interacting_with_HTML.pptx
@@ -1,6 +1,6 @@
 
 <file path=ppt/presentation.xml><?xml version="1.0" encoding="utf-8"?>
-<p:presentation xmlns:a="http://schemas.openxmlformats.org/drawingml/2006/main" xmlns:r="http://schemas.openxmlformats.org/officeDocument/2006/relationships" xmlns:p="http://schemas.openxmlformats.org/presentationml/2006/main" strictFirstAndLastChars="0" embedTrueTypeFonts="1" saveSubsetFonts="1" autoCompressPictures="0">
+<p:presentation xmlns:a="http://schemas.openxmlformats.org/drawingml/2006/main" xmlns:r="http://schemas.openxmlformats.org/officeDocument/2006/relationships" xmlns:p="http://schemas.openxmlformats.org/presentationml/2006/main" strictFirstAndLastChars="0" saveSubsetFonts="1" autoCompressPictures="0">
   <p:sldMasterIdLst>
     <p:sldMasterId id="2147483659" r:id="rId1"/>
   </p:sldMasterIdLst>
@@ -237,6 +237,22 @@
       </a:defRPr>
     </a:lvl9pPr>
   </p:defaultTextStyle>
+  <p:extLst>
+    <p:ext uri="{EFAFB233-063F-42B5-8137-9DF3F51BA10A}">
+      <p15:sldGuideLst xmlns:p15="http://schemas.microsoft.com/office/powerpoint/2012/main">
+        <p15:guide id="1" orient="horz" pos="1620">
+          <p15:clr>
+            <a:srgbClr val="A4A3A4"/>
+          </p15:clr>
+        </p15:guide>
+        <p15:guide id="2" pos="2880">
+          <p15:clr>
+            <a:srgbClr val="A4A3A4"/>
+          </p15:clr>
+        </p15:guide>
+      </p15:sldGuideLst>
+    </p:ext>
+  </p:extLst>
 </p:presentation>
 </file>
 
@@ -1038,13 +1054,98 @@
           </a:bodyPr>
           <a:lstStyle/>
           <a:p>
-            <a:pPr lvl="0">
-              <a:spcBef>
-                <a:spcPts val="0"/>
-              </a:spcBef>
-              <a:buNone/>
-            </a:pPr>
-            <a:endParaRPr/>
+            <a:r>
+              <a:rPr lang="en-US" sz="1100" kern="1200" dirty="0" smtClean="0">
+                <a:solidFill>
+                  <a:schemeClr val="tx1"/>
+                </a:solidFill>
+                <a:effectLst/>
+                <a:latin typeface="+mn-lt"/>
+                <a:ea typeface="+mn-ea"/>
+                <a:cs typeface="+mn-cs"/>
+              </a:rPr>
+              <a:t>Breakdown different segments of the whole function call so it is more clear what each part represents, for example:</a:t>
+            </a:r>
+          </a:p>
+          <a:p>
+            <a:r>
+              <a:rPr lang="en-US" sz="1100" kern="1200" dirty="0" smtClean="0">
+                <a:solidFill>
+                  <a:schemeClr val="tx1"/>
+                </a:solidFill>
+                <a:effectLst/>
+                <a:latin typeface="+mn-lt"/>
+                <a:ea typeface="+mn-ea"/>
+                <a:cs typeface="+mn-cs"/>
+              </a:rPr>
+              <a:t>&lt;B - to this element&gt;.</a:t>
+            </a:r>
+            <a:r>
+              <a:rPr lang="en-US" sz="1100" kern="1200" dirty="0" err="1" smtClean="0">
+                <a:solidFill>
+                  <a:schemeClr val="tx1"/>
+                </a:solidFill>
+                <a:effectLst/>
+                <a:latin typeface="+mn-lt"/>
+                <a:ea typeface="+mn-ea"/>
+                <a:cs typeface="+mn-cs"/>
+              </a:rPr>
+              <a:t>addEventListener</a:t>
+            </a:r>
+            <a:r>
+              <a:rPr lang="en-US" sz="1100" kern="1200" dirty="0" smtClean="0">
+                <a:solidFill>
+                  <a:schemeClr val="tx1"/>
+                </a:solidFill>
+                <a:effectLst/>
+                <a:latin typeface="+mn-lt"/>
+                <a:ea typeface="+mn-ea"/>
+                <a:cs typeface="+mn-cs"/>
+              </a:rPr>
+              <a:t>(&lt;A - when user does this&gt;, &lt;C - then make these changes&gt;)</a:t>
+            </a:r>
+          </a:p>
+          <a:p>
+            <a:r>
+              <a:rPr lang="en-US" sz="1100" kern="1200" dirty="0" smtClean="0">
+                <a:solidFill>
+                  <a:schemeClr val="tx1"/>
+                </a:solidFill>
+                <a:effectLst/>
+                <a:latin typeface="+mn-lt"/>
+                <a:ea typeface="+mn-ea"/>
+                <a:cs typeface="+mn-cs"/>
+              </a:rPr>
+              <a:t>A is a string representing the action, such as “click”</a:t>
+            </a:r>
+          </a:p>
+          <a:p>
+            <a:r>
+              <a:rPr lang="en-US" sz="1100" kern="1200" dirty="0" smtClean="0">
+                <a:solidFill>
+                  <a:schemeClr val="tx1"/>
+                </a:solidFill>
+                <a:effectLst/>
+                <a:latin typeface="+mn-lt"/>
+                <a:ea typeface="+mn-ea"/>
+                <a:cs typeface="+mn-cs"/>
+              </a:rPr>
+              <a:t>B is the element that the user would perform action A on</a:t>
+            </a:r>
+          </a:p>
+          <a:p>
+            <a:r>
+              <a:rPr lang="en-US" sz="1100" kern="1200" dirty="0" smtClean="0">
+                <a:solidFill>
+                  <a:schemeClr val="tx1"/>
+                </a:solidFill>
+                <a:effectLst/>
+                <a:latin typeface="+mn-lt"/>
+                <a:ea typeface="+mn-ea"/>
+                <a:cs typeface="+mn-cs"/>
+              </a:rPr>
+              <a:t>C is a function containing the code that should be run after a user has done action A to element B.</a:t>
+            </a:r>
           </a:p>
         </p:txBody>
       </p:sp>
@@ -15159,22 +15260,7 @@
                 <a:cs typeface="Consolas"/>
                 <a:sym typeface="Source Code Pro"/>
               </a:rPr>
-              <a:t>// </a:t>
-            </a:r>
-            <a:r>
-              <a:rPr lang="en" sz="1400" dirty="0" smtClean="0">
-                <a:solidFill>
-                  <a:srgbClr val="999999"/>
-                </a:solidFill>
-                <a:highlight>
-                  <a:srgbClr val="FFFFFF"/>
-                </a:highlight>
-                <a:latin typeface="Consolas"/>
-                <a:ea typeface="Source Code Pro"/>
-                <a:cs typeface="Consolas"/>
-                <a:sym typeface="Source Code Pro"/>
-              </a:rPr>
-              <a:t>Create a text node</a:t>
+              <a:t>// Create a text node</a:t>
             </a:r>
             <a:endParaRPr lang="en-US" sz="1400" dirty="0" smtClean="0">
               <a:solidFill>

</xml_diff>